<commit_message>
update pic Class' relation
</commit_message>
<xml_diff>
--- a/Reflection & Proxy/Class类的关系.pptx
+++ b/Reflection & Proxy/Class类的关系.pptx
@@ -2977,7 +2977,7 @@
         </p:nvSpPr>
         <p:spPr>
           <a:xfrm>
-            <a:off x="4496500" y="1320566"/>
+            <a:off x="4228052" y="1320566"/>
             <a:ext cx="1988191" cy="864066"/>
           </a:xfrm>
           <a:prstGeom prst="roundRect">
@@ -3021,7 +3021,7 @@
         </p:nvSpPr>
         <p:spPr>
           <a:xfrm>
-            <a:off x="7952770" y="1884025"/>
+            <a:off x="7684322" y="1884025"/>
             <a:ext cx="1400962" cy="415255"/>
           </a:xfrm>
           <a:prstGeom prst="rect">
@@ -3071,7 +3071,7 @@
         </p:nvSpPr>
         <p:spPr>
           <a:xfrm>
-            <a:off x="7948577" y="1244364"/>
+            <a:off x="7680129" y="1244364"/>
             <a:ext cx="1400962" cy="415255"/>
           </a:xfrm>
           <a:prstGeom prst="rect">
@@ -3124,7 +3124,7 @@
         </p:nvCxnSpPr>
         <p:spPr>
           <a:xfrm flipV="1">
-            <a:off x="6484691" y="1451992"/>
+            <a:off x="6216243" y="1451992"/>
             <a:ext cx="1463886" cy="300607"/>
           </a:xfrm>
           <a:prstGeom prst="straightConnector1">
@@ -3160,7 +3160,7 @@
         </p:nvCxnSpPr>
         <p:spPr>
           <a:xfrm>
-            <a:off x="6484691" y="1752599"/>
+            <a:off x="6216243" y="1752599"/>
             <a:ext cx="1468079" cy="339054"/>
           </a:xfrm>
           <a:prstGeom prst="straightConnector1">
@@ -3193,7 +3193,7 @@
         </p:nvSpPr>
         <p:spPr>
           <a:xfrm>
-            <a:off x="4496500" y="2835479"/>
+            <a:off x="4228052" y="2835479"/>
             <a:ext cx="1988191" cy="864066"/>
           </a:xfrm>
           <a:prstGeom prst="roundRect">
@@ -3236,7 +3236,7 @@
         </p:nvSpPr>
         <p:spPr>
           <a:xfrm>
-            <a:off x="7961156" y="3362324"/>
+            <a:off x="7692708" y="3362324"/>
             <a:ext cx="1400962" cy="415255"/>
           </a:xfrm>
           <a:prstGeom prst="rect">
@@ -3302,7 +3302,7 @@
         </p:nvSpPr>
         <p:spPr>
           <a:xfrm>
-            <a:off x="7956963" y="2722663"/>
+            <a:off x="7688515" y="2722663"/>
             <a:ext cx="1400962" cy="415255"/>
           </a:xfrm>
           <a:prstGeom prst="rect">
@@ -3355,7 +3355,7 @@
         </p:nvCxnSpPr>
         <p:spPr>
           <a:xfrm flipV="1">
-            <a:off x="6484691" y="2930291"/>
+            <a:off x="6216243" y="2930291"/>
             <a:ext cx="1472272" cy="337221"/>
           </a:xfrm>
           <a:prstGeom prst="straightConnector1">
@@ -3391,7 +3391,7 @@
         </p:nvCxnSpPr>
         <p:spPr>
           <a:xfrm>
-            <a:off x="6484691" y="3267512"/>
+            <a:off x="6216243" y="3267512"/>
             <a:ext cx="1476465" cy="302440"/>
           </a:xfrm>
           <a:prstGeom prst="straightConnector1">
@@ -3424,7 +3424,7 @@
         </p:nvSpPr>
         <p:spPr>
           <a:xfrm>
-            <a:off x="4496500" y="4315611"/>
+            <a:off x="4228052" y="4315611"/>
             <a:ext cx="1988191" cy="864066"/>
           </a:xfrm>
           <a:prstGeom prst="roundRect">
@@ -3468,7 +3468,7 @@
         </p:nvSpPr>
         <p:spPr>
           <a:xfrm>
-            <a:off x="7965349" y="4831969"/>
+            <a:off x="7696901" y="4831969"/>
             <a:ext cx="1400962" cy="415255"/>
           </a:xfrm>
           <a:prstGeom prst="rect">
@@ -3518,7 +3518,7 @@
         </p:nvSpPr>
         <p:spPr>
           <a:xfrm>
-            <a:off x="7961156" y="4192308"/>
+            <a:off x="7692708" y="4192308"/>
             <a:ext cx="1400962" cy="415255"/>
           </a:xfrm>
           <a:prstGeom prst="rect">
@@ -3571,7 +3571,7 @@
         </p:nvCxnSpPr>
         <p:spPr>
           <a:xfrm flipV="1">
-            <a:off x="6484691" y="4399936"/>
+            <a:off x="6216243" y="4399936"/>
             <a:ext cx="1476465" cy="347708"/>
           </a:xfrm>
           <a:prstGeom prst="straightConnector1">
@@ -3607,7 +3607,7 @@
         </p:nvCxnSpPr>
         <p:spPr>
           <a:xfrm>
-            <a:off x="6484691" y="4747644"/>
+            <a:off x="6216243" y="4747644"/>
             <a:ext cx="1480658" cy="291953"/>
           </a:xfrm>
           <a:prstGeom prst="straightConnector1">
@@ -3643,7 +3643,7 @@
         </p:nvCxnSpPr>
         <p:spPr>
           <a:xfrm>
-            <a:off x="5490596" y="2184632"/>
+            <a:off x="5222148" y="2184632"/>
             <a:ext cx="0" cy="650847"/>
           </a:xfrm>
           <a:prstGeom prst="straightConnector1">
@@ -3679,7 +3679,7 @@
         </p:nvCxnSpPr>
         <p:spPr>
           <a:xfrm flipV="1">
-            <a:off x="5490596" y="3699545"/>
+            <a:off x="5222148" y="3699545"/>
             <a:ext cx="0" cy="616066"/>
           </a:xfrm>
           <a:prstGeom prst="straightConnector1">
@@ -3712,7 +3712,7 @@
         </p:nvSpPr>
         <p:spPr>
           <a:xfrm>
-            <a:off x="4311944" y="1076325"/>
+            <a:off x="4043496" y="1076325"/>
             <a:ext cx="2323751" cy="4533900"/>
           </a:xfrm>
           <a:prstGeom prst="rect">
@@ -3758,7 +3758,7 @@
         </p:nvSpPr>
         <p:spPr>
           <a:xfrm>
-            <a:off x="7614323" y="1076325"/>
+            <a:off x="7345875" y="1076325"/>
             <a:ext cx="2114550" cy="4533900"/>
           </a:xfrm>
           <a:prstGeom prst="rect">
@@ -3800,7 +3800,7 @@
         </p:nvSpPr>
         <p:spPr>
           <a:xfrm>
-            <a:off x="7210783" y="5817853"/>
+            <a:off x="6942335" y="5817853"/>
             <a:ext cx="2876550" cy="369332"/>
           </a:xfrm>
           <a:prstGeom prst="rect">
@@ -3825,11 +3825,7 @@
             </a:r>
             <a:r>
               <a:rPr lang="zh-CN" altLang="en-US" dirty="0" smtClean="0"/>
-              <a:t>类实例</a:t>
-            </a:r>
-            <a:r>
-              <a:rPr lang="zh-CN" altLang="en-US" dirty="0" smtClean="0"/>
-              <a:t>的实例</a:t>
+              <a:t>类实例的实例</a:t>
             </a:r>
             <a:endParaRPr lang="zh-CN" altLang="en-US" dirty="0"/>
           </a:p>
@@ -3843,7 +3839,7 @@
         </p:nvSpPr>
         <p:spPr>
           <a:xfrm>
-            <a:off x="4035544" y="5751571"/>
+            <a:off x="3767096" y="5751571"/>
             <a:ext cx="2876550" cy="646331"/>
           </a:xfrm>
           <a:prstGeom prst="rect">
@@ -3889,7 +3885,7 @@
         </p:nvSpPr>
         <p:spPr>
           <a:xfrm>
-            <a:off x="6764282" y="2224918"/>
+            <a:off x="6495834" y="2224918"/>
             <a:ext cx="721453" cy="369332"/>
           </a:xfrm>
           <a:prstGeom prst="rect">
@@ -3918,7 +3914,7 @@
         </p:nvSpPr>
         <p:spPr>
           <a:xfrm>
-            <a:off x="6764282" y="5038904"/>
+            <a:off x="6495834" y="5038904"/>
             <a:ext cx="721453" cy="369332"/>
           </a:xfrm>
           <a:prstGeom prst="rect">
@@ -3947,7 +3943,7 @@
         </p:nvSpPr>
         <p:spPr>
           <a:xfrm>
-            <a:off x="6764282" y="3646896"/>
+            <a:off x="6495834" y="3646896"/>
             <a:ext cx="721453" cy="369332"/>
           </a:xfrm>
           <a:prstGeom prst="rect">
@@ -3976,7 +3972,7 @@
         </p:nvSpPr>
         <p:spPr>
           <a:xfrm>
-            <a:off x="4639113" y="3830719"/>
+            <a:off x="4370665" y="3830719"/>
             <a:ext cx="922310" cy="338554"/>
           </a:xfrm>
           <a:prstGeom prst="rect">
@@ -4006,7 +4002,7 @@
         </p:nvSpPr>
         <p:spPr>
           <a:xfrm>
-            <a:off x="4639113" y="2286818"/>
+            <a:off x="4370665" y="2286818"/>
             <a:ext cx="922310" cy="338554"/>
           </a:xfrm>
           <a:prstGeom prst="rect">
@@ -4036,7 +4032,7 @@
         </p:nvSpPr>
         <p:spPr>
           <a:xfrm>
-            <a:off x="557215" y="2600615"/>
+            <a:off x="288767" y="2600615"/>
             <a:ext cx="2330045" cy="1333794"/>
           </a:xfrm>
           <a:prstGeom prst="ellipse">
@@ -4087,7 +4083,7 @@
         </p:nvCxnSpPr>
         <p:spPr>
           <a:xfrm>
-            <a:off x="2887260" y="3267512"/>
+            <a:off x="2618812" y="3267512"/>
             <a:ext cx="1609240" cy="0"/>
           </a:xfrm>
           <a:prstGeom prst="straightConnector1">
@@ -4122,7 +4118,7 @@
         </p:nvCxnSpPr>
         <p:spPr>
           <a:xfrm rot="5400000" flipH="1" flipV="1">
-            <a:off x="3431473" y="2202485"/>
+            <a:off x="3163025" y="2202485"/>
             <a:ext cx="1514913" cy="615142"/>
           </a:xfrm>
           <a:prstGeom prst="bentConnector2">
@@ -4155,7 +4151,7 @@
         </p:nvSpPr>
         <p:spPr>
           <a:xfrm>
-            <a:off x="1701118" y="1584467"/>
+            <a:off x="1432670" y="1584467"/>
             <a:ext cx="2262158" cy="1200329"/>
           </a:xfrm>
           <a:prstGeom prst="rect">
@@ -4180,11 +4176,7 @@
             <a:pPr algn="ctr"/>
             <a:r>
               <a:rPr lang="zh-CN" altLang="en-US" dirty="0" smtClean="0"/>
-              <a:t>或者调用</a:t>
-            </a:r>
-            <a:r>
-              <a:rPr lang="zh-CN" altLang="en-US" dirty="0" smtClean="0"/>
-              <a:t>类加载器的</a:t>
+              <a:t>或者调用类加载器的</a:t>
             </a:r>
             <a:endParaRPr lang="en-US" altLang="zh-CN" dirty="0"/>
           </a:p>
@@ -4217,8 +4209,8 @@
         </p:nvSpPr>
         <p:spPr>
           <a:xfrm>
-            <a:off x="4114280" y="536895"/>
-            <a:ext cx="6053178" cy="5861007"/>
+            <a:off x="142613" y="536895"/>
+            <a:ext cx="9756397" cy="5861007"/>
           </a:xfrm>
           <a:prstGeom prst="rect">
             <a:avLst/>
@@ -4263,7 +4255,7 @@
         </p:nvCxnSpPr>
         <p:spPr>
           <a:xfrm rot="16200000" flipH="1">
-            <a:off x="3448863" y="3700007"/>
+            <a:off x="3180415" y="3700007"/>
             <a:ext cx="1480132" cy="615142"/>
           </a:xfrm>
           <a:prstGeom prst="bentConnector2">
@@ -4296,7 +4288,7 @@
         </p:nvCxnSpPr>
         <p:spPr>
           <a:xfrm flipV="1">
-            <a:off x="10167458" y="2594250"/>
+            <a:off x="9882232" y="2594250"/>
             <a:ext cx="612395" cy="6365"/>
           </a:xfrm>
           <a:prstGeom prst="straightConnector1">
@@ -4332,8 +4324,8 @@
         </p:nvSpPr>
         <p:spPr>
           <a:xfrm>
-            <a:off x="10606043" y="2216147"/>
-            <a:ext cx="1569660" cy="646331"/>
+            <a:off x="10428376" y="2207761"/>
+            <a:ext cx="1763624" cy="646331"/>
           </a:xfrm>
           <a:prstGeom prst="rect">
             <a:avLst/>
@@ -4348,12 +4340,15 @@
           <a:p>
             <a:r>
               <a:rPr lang="zh-CN" altLang="en-US" dirty="0" smtClean="0"/>
-              <a:t>这些实例都是</a:t>
+              <a:t>这些类和实例</a:t>
             </a:r>
             <a:endParaRPr lang="en-US" altLang="zh-CN" dirty="0" smtClean="0"/>
           </a:p>
           <a:p>
-            <a:pPr algn="ctr"/>
+            <a:r>
+              <a:rPr lang="zh-CN" altLang="en-US" dirty="0" smtClean="0"/>
+              <a:t>都是</a:t>
+            </a:r>
             <a:r>
               <a:rPr lang="en-US" altLang="zh-CN" dirty="0" smtClean="0"/>
               <a:t>Object</a:t>

</xml_diff>